<commit_message>
Immune dynamics movies and start on nested model
</commit_message>
<xml_diff>
--- a/Grant_figure_4.pptx
+++ b/Grant_figure_4.pptx
@@ -243,7 +243,7 @@
           <a:p>
             <a:fld id="{DF4D41E4-F8C1-0241-8229-775EA06FCC2F}" type="datetimeFigureOut">
               <a:rPr lang="en-US" smtClean="0"/>
-              <a:t>11/2/20</a:t>
+              <a:t>3/1/22</a:t>
             </a:fld>
             <a:endParaRPr lang="en-US"/>
           </a:p>
@@ -413,7 +413,7 @@
           <a:p>
             <a:fld id="{DF4D41E4-F8C1-0241-8229-775EA06FCC2F}" type="datetimeFigureOut">
               <a:rPr lang="en-US" smtClean="0"/>
-              <a:t>11/2/20</a:t>
+              <a:t>3/1/22</a:t>
             </a:fld>
             <a:endParaRPr lang="en-US"/>
           </a:p>
@@ -593,7 +593,7 @@
           <a:p>
             <a:fld id="{DF4D41E4-F8C1-0241-8229-775EA06FCC2F}" type="datetimeFigureOut">
               <a:rPr lang="en-US" smtClean="0"/>
-              <a:t>11/2/20</a:t>
+              <a:t>3/1/22</a:t>
             </a:fld>
             <a:endParaRPr lang="en-US"/>
           </a:p>
@@ -763,7 +763,7 @@
           <a:p>
             <a:fld id="{DF4D41E4-F8C1-0241-8229-775EA06FCC2F}" type="datetimeFigureOut">
               <a:rPr lang="en-US" smtClean="0"/>
-              <a:t>11/2/20</a:t>
+              <a:t>3/1/22</a:t>
             </a:fld>
             <a:endParaRPr lang="en-US"/>
           </a:p>
@@ -1009,7 +1009,7 @@
           <a:p>
             <a:fld id="{DF4D41E4-F8C1-0241-8229-775EA06FCC2F}" type="datetimeFigureOut">
               <a:rPr lang="en-US" smtClean="0"/>
-              <a:t>11/2/20</a:t>
+              <a:t>3/1/22</a:t>
             </a:fld>
             <a:endParaRPr lang="en-US"/>
           </a:p>
@@ -1241,7 +1241,7 @@
           <a:p>
             <a:fld id="{DF4D41E4-F8C1-0241-8229-775EA06FCC2F}" type="datetimeFigureOut">
               <a:rPr lang="en-US" smtClean="0"/>
-              <a:t>11/2/20</a:t>
+              <a:t>3/1/22</a:t>
             </a:fld>
             <a:endParaRPr lang="en-US"/>
           </a:p>
@@ -1608,7 +1608,7 @@
           <a:p>
             <a:fld id="{DF4D41E4-F8C1-0241-8229-775EA06FCC2F}" type="datetimeFigureOut">
               <a:rPr lang="en-US" smtClean="0"/>
-              <a:t>11/2/20</a:t>
+              <a:t>3/1/22</a:t>
             </a:fld>
             <a:endParaRPr lang="en-US"/>
           </a:p>
@@ -1726,7 +1726,7 @@
           <a:p>
             <a:fld id="{DF4D41E4-F8C1-0241-8229-775EA06FCC2F}" type="datetimeFigureOut">
               <a:rPr lang="en-US" smtClean="0"/>
-              <a:t>11/2/20</a:t>
+              <a:t>3/1/22</a:t>
             </a:fld>
             <a:endParaRPr lang="en-US"/>
           </a:p>
@@ -1821,7 +1821,7 @@
           <a:p>
             <a:fld id="{DF4D41E4-F8C1-0241-8229-775EA06FCC2F}" type="datetimeFigureOut">
               <a:rPr lang="en-US" smtClean="0"/>
-              <a:t>11/2/20</a:t>
+              <a:t>3/1/22</a:t>
             </a:fld>
             <a:endParaRPr lang="en-US"/>
           </a:p>
@@ -2098,7 +2098,7 @@
           <a:p>
             <a:fld id="{DF4D41E4-F8C1-0241-8229-775EA06FCC2F}" type="datetimeFigureOut">
               <a:rPr lang="en-US" smtClean="0"/>
-              <a:t>11/2/20</a:t>
+              <a:t>3/1/22</a:t>
             </a:fld>
             <a:endParaRPr lang="en-US"/>
           </a:p>
@@ -2355,7 +2355,7 @@
           <a:p>
             <a:fld id="{DF4D41E4-F8C1-0241-8229-775EA06FCC2F}" type="datetimeFigureOut">
               <a:rPr lang="en-US" smtClean="0"/>
-              <a:t>11/2/20</a:t>
+              <a:t>3/1/22</a:t>
             </a:fld>
             <a:endParaRPr lang="en-US"/>
           </a:p>
@@ -2568,7 +2568,7 @@
           <a:p>
             <a:fld id="{DF4D41E4-F8C1-0241-8229-775EA06FCC2F}" type="datetimeFigureOut">
               <a:rPr lang="en-US" smtClean="0"/>
-              <a:t>11/2/20</a:t>
+              <a:t>3/1/22</a:t>
             </a:fld>
             <a:endParaRPr lang="en-US"/>
           </a:p>
@@ -3453,6 +3453,47 @@
           </a:p>
         </p:txBody>
       </p:sp>
+      <p:sp>
+        <p:nvSpPr>
+          <p:cNvPr id="17" name="TextBox 16">
+            <a:extLst>
+              <a:ext uri="{FF2B5EF4-FFF2-40B4-BE49-F238E27FC236}">
+                <a16:creationId xmlns:a16="http://schemas.microsoft.com/office/drawing/2014/main" id="{F6BDF598-8E7A-C643-8729-B9F0CDCB7572}"/>
+              </a:ext>
+            </a:extLst>
+          </p:cNvPr>
+          <p:cNvSpPr txBox="1"/>
+          <p:nvPr/>
+        </p:nvSpPr>
+        <p:spPr>
+          <a:xfrm>
+            <a:off x="4461013" y="4307187"/>
+            <a:ext cx="3269974" cy="369332"/>
+          </a:xfrm>
+          <a:prstGeom prst="rect">
+            <a:avLst/>
+          </a:prstGeom>
+          <a:solidFill>
+            <a:schemeClr val="bg1"/>
+          </a:solidFill>
+        </p:spPr>
+        <p:txBody>
+          <a:bodyPr wrap="square" rtlCol="0">
+            <a:spAutoFit/>
+          </a:bodyPr>
+          <a:lstStyle/>
+          <a:p>
+            <a:pPr algn="ctr"/>
+            <a:r>
+              <a:rPr lang="en-US" dirty="0">
+                <a:latin typeface="Arial" panose="020B0604020202020204" pitchFamily="34" charset="0"/>
+                <a:cs typeface="Arial" panose="020B0604020202020204" pitchFamily="34" charset="0"/>
+              </a:rPr>
+              <a:t>Days post-infection</a:t>
+            </a:r>
+          </a:p>
+        </p:txBody>
+      </p:sp>
     </p:spTree>
     <p:extLst>
       <p:ext uri="{BB962C8B-B14F-4D97-AF65-F5344CB8AC3E}">

</xml_diff>